<commit_message>
Updating presentation, final time
</commit_message>
<xml_diff>
--- a/documentation/Astronomer Panel Presentation.pptx
+++ b/documentation/Astronomer Panel Presentation.pptx
@@ -228,7 +228,7 @@
           <a:p>
             <a:fld id="{90C15DD1-40EF-DA4B-A348-423AC3DC734A}" type="datetimeFigureOut">
               <a:rPr lang="en-US" smtClean="0"/>
-              <a:t>12/5/23</a:t>
+              <a:t>12/6/23</a:t>
             </a:fld>
             <a:endParaRPr lang="en-US"/>
           </a:p>
@@ -3733,7 +3733,7 @@
           <a:p>
             <a:fld id="{C20961CD-0C9C-0148-8F26-BF7F9291428C}" type="datetimeFigureOut">
               <a:rPr lang="en-US" smtClean="0"/>
-              <a:t>12/5/23</a:t>
+              <a:t>12/6/23</a:t>
             </a:fld>
             <a:endParaRPr lang="en-US"/>
           </a:p>
@@ -3931,7 +3931,7 @@
           <a:p>
             <a:fld id="{C20961CD-0C9C-0148-8F26-BF7F9291428C}" type="datetimeFigureOut">
               <a:rPr lang="en-US" smtClean="0"/>
-              <a:t>12/5/23</a:t>
+              <a:t>12/6/23</a:t>
             </a:fld>
             <a:endParaRPr lang="en-US"/>
           </a:p>
@@ -4139,7 +4139,7 @@
           <a:p>
             <a:fld id="{C20961CD-0C9C-0148-8F26-BF7F9291428C}" type="datetimeFigureOut">
               <a:rPr lang="en-US" smtClean="0"/>
-              <a:t>12/5/23</a:t>
+              <a:t>12/6/23</a:t>
             </a:fld>
             <a:endParaRPr lang="en-US"/>
           </a:p>
@@ -4337,7 +4337,7 @@
           <a:p>
             <a:fld id="{C20961CD-0C9C-0148-8F26-BF7F9291428C}" type="datetimeFigureOut">
               <a:rPr lang="en-US" smtClean="0"/>
-              <a:t>12/5/23</a:t>
+              <a:t>12/6/23</a:t>
             </a:fld>
             <a:endParaRPr lang="en-US"/>
           </a:p>
@@ -4612,7 +4612,7 @@
           <a:p>
             <a:fld id="{C20961CD-0C9C-0148-8F26-BF7F9291428C}" type="datetimeFigureOut">
               <a:rPr lang="en-US" smtClean="0"/>
-              <a:t>12/5/23</a:t>
+              <a:t>12/6/23</a:t>
             </a:fld>
             <a:endParaRPr lang="en-US"/>
           </a:p>
@@ -4877,7 +4877,7 @@
           <a:p>
             <a:fld id="{C20961CD-0C9C-0148-8F26-BF7F9291428C}" type="datetimeFigureOut">
               <a:rPr lang="en-US" smtClean="0"/>
-              <a:t>12/5/23</a:t>
+              <a:t>12/6/23</a:t>
             </a:fld>
             <a:endParaRPr lang="en-US"/>
           </a:p>
@@ -5289,7 +5289,7 @@
           <a:p>
             <a:fld id="{C20961CD-0C9C-0148-8F26-BF7F9291428C}" type="datetimeFigureOut">
               <a:rPr lang="en-US" smtClean="0"/>
-              <a:t>12/5/23</a:t>
+              <a:t>12/6/23</a:t>
             </a:fld>
             <a:endParaRPr lang="en-US"/>
           </a:p>
@@ -5430,7 +5430,7 @@
           <a:p>
             <a:fld id="{C20961CD-0C9C-0148-8F26-BF7F9291428C}" type="datetimeFigureOut">
               <a:rPr lang="en-US" smtClean="0"/>
-              <a:t>12/5/23</a:t>
+              <a:t>12/6/23</a:t>
             </a:fld>
             <a:endParaRPr lang="en-US"/>
           </a:p>
@@ -5543,7 +5543,7 @@
           <a:p>
             <a:fld id="{C20961CD-0C9C-0148-8F26-BF7F9291428C}" type="datetimeFigureOut">
               <a:rPr lang="en-US" smtClean="0"/>
-              <a:t>12/5/23</a:t>
+              <a:t>12/6/23</a:t>
             </a:fld>
             <a:endParaRPr lang="en-US"/>
           </a:p>
@@ -5854,7 +5854,7 @@
           <a:p>
             <a:fld id="{C20961CD-0C9C-0148-8F26-BF7F9291428C}" type="datetimeFigureOut">
               <a:rPr lang="en-US" smtClean="0"/>
-              <a:t>12/5/23</a:t>
+              <a:t>12/6/23</a:t>
             </a:fld>
             <a:endParaRPr lang="en-US"/>
           </a:p>
@@ -6142,7 +6142,7 @@
           <a:p>
             <a:fld id="{C20961CD-0C9C-0148-8F26-BF7F9291428C}" type="datetimeFigureOut">
               <a:rPr lang="en-US" smtClean="0"/>
-              <a:t>12/5/23</a:t>
+              <a:t>12/6/23</a:t>
             </a:fld>
             <a:endParaRPr lang="en-US"/>
           </a:p>
@@ -6383,7 +6383,7 @@
           <a:p>
             <a:fld id="{C20961CD-0C9C-0148-8F26-BF7F9291428C}" type="datetimeFigureOut">
               <a:rPr lang="en-US" smtClean="0"/>
-              <a:t>12/5/23</a:t>
+              <a:t>12/6/23</a:t>
             </a:fld>
             <a:endParaRPr lang="en-US"/>
           </a:p>
@@ -25865,7 +25865,7 @@
                 <a:latin typeface="Helvetica" pitchFamily="2" charset="0"/>
                 <a:cs typeface="Arial" panose="020B0604020202020204" pitchFamily="34" charset="0"/>
               </a:rPr>
-              <a:t>Airflow helps to simplify developing and maintaining data workflows of all types</a:t>
+              <a:t>Airflow simplifies developing and maintaining data workflows of all types</a:t>
             </a:r>
           </a:p>
         </p:txBody>

</xml_diff>